<commit_message>
added error log from vbox
</commit_message>
<xml_diff>
--- a/Tutorials/MainTutorial.pptx
+++ b/Tutorials/MainTutorial.pptx
@@ -19,6 +19,7 @@
     <p:sldId id="267" r:id="rId13"/>
     <p:sldId id="269" r:id="rId14"/>
     <p:sldId id="268" r:id="rId15"/>
+    <p:sldId id="270" r:id="rId16"/>
   </p:sldIdLst>
   <p:sldSz cx="12192000" cy="6858000"/>
   <p:notesSz cx="6858000" cy="9144000"/>
@@ -117,6 +118,11 @@
       </a:defRPr>
     </a:lvl9pPr>
   </p:defaultTextStyle>
+  <p:extLst>
+    <p:ext uri="{EFAFB233-063F-42B5-8137-9DF3F51BA10A}">
+      <p15:sldGuideLst xmlns:p15="http://schemas.microsoft.com/office/powerpoint/2012/main"/>
+    </p:ext>
+  </p:extLst>
 </p:presentation>
 </file>
 
@@ -267,7 +273,7 @@
           <a:p>
             <a:fld id="{ACC001CD-8C42-4D76-B3BE-7A9DD50F3019}" type="datetimeFigureOut">
               <a:rPr lang="en-US" smtClean="0"/>
-              <a:t>2/27/2020</a:t>
+              <a:t>2/28/2020</a:t>
             </a:fld>
             <a:endParaRPr lang="en-US"/>
           </a:p>
@@ -465,7 +471,7 @@
           <a:p>
             <a:fld id="{ACC001CD-8C42-4D76-B3BE-7A9DD50F3019}" type="datetimeFigureOut">
               <a:rPr lang="en-US" smtClean="0"/>
-              <a:t>2/27/2020</a:t>
+              <a:t>2/28/2020</a:t>
             </a:fld>
             <a:endParaRPr lang="en-US"/>
           </a:p>
@@ -673,7 +679,7 @@
           <a:p>
             <a:fld id="{ACC001CD-8C42-4D76-B3BE-7A9DD50F3019}" type="datetimeFigureOut">
               <a:rPr lang="en-US" smtClean="0"/>
-              <a:t>2/27/2020</a:t>
+              <a:t>2/28/2020</a:t>
             </a:fld>
             <a:endParaRPr lang="en-US"/>
           </a:p>
@@ -871,7 +877,7 @@
           <a:p>
             <a:fld id="{ACC001CD-8C42-4D76-B3BE-7A9DD50F3019}" type="datetimeFigureOut">
               <a:rPr lang="en-US" smtClean="0"/>
-              <a:t>2/27/2020</a:t>
+              <a:t>2/28/2020</a:t>
             </a:fld>
             <a:endParaRPr lang="en-US"/>
           </a:p>
@@ -1146,7 +1152,7 @@
           <a:p>
             <a:fld id="{ACC001CD-8C42-4D76-B3BE-7A9DD50F3019}" type="datetimeFigureOut">
               <a:rPr lang="en-US" smtClean="0"/>
-              <a:t>2/27/2020</a:t>
+              <a:t>2/28/2020</a:t>
             </a:fld>
             <a:endParaRPr lang="en-US"/>
           </a:p>
@@ -1411,7 +1417,7 @@
           <a:p>
             <a:fld id="{ACC001CD-8C42-4D76-B3BE-7A9DD50F3019}" type="datetimeFigureOut">
               <a:rPr lang="en-US" smtClean="0"/>
-              <a:t>2/27/2020</a:t>
+              <a:t>2/28/2020</a:t>
             </a:fld>
             <a:endParaRPr lang="en-US"/>
           </a:p>
@@ -1823,7 +1829,7 @@
           <a:p>
             <a:fld id="{ACC001CD-8C42-4D76-B3BE-7A9DD50F3019}" type="datetimeFigureOut">
               <a:rPr lang="en-US" smtClean="0"/>
-              <a:t>2/27/2020</a:t>
+              <a:t>2/28/2020</a:t>
             </a:fld>
             <a:endParaRPr lang="en-US"/>
           </a:p>
@@ -1964,7 +1970,7 @@
           <a:p>
             <a:fld id="{ACC001CD-8C42-4D76-B3BE-7A9DD50F3019}" type="datetimeFigureOut">
               <a:rPr lang="en-US" smtClean="0"/>
-              <a:t>2/27/2020</a:t>
+              <a:t>2/28/2020</a:t>
             </a:fld>
             <a:endParaRPr lang="en-US"/>
           </a:p>
@@ -2077,7 +2083,7 @@
           <a:p>
             <a:fld id="{ACC001CD-8C42-4D76-B3BE-7A9DD50F3019}" type="datetimeFigureOut">
               <a:rPr lang="en-US" smtClean="0"/>
-              <a:t>2/27/2020</a:t>
+              <a:t>2/28/2020</a:t>
             </a:fld>
             <a:endParaRPr lang="en-US"/>
           </a:p>
@@ -2388,7 +2394,7 @@
           <a:p>
             <a:fld id="{ACC001CD-8C42-4D76-B3BE-7A9DD50F3019}" type="datetimeFigureOut">
               <a:rPr lang="en-US" smtClean="0"/>
-              <a:t>2/27/2020</a:t>
+              <a:t>2/28/2020</a:t>
             </a:fld>
             <a:endParaRPr lang="en-US"/>
           </a:p>
@@ -2676,7 +2682,7 @@
           <a:p>
             <a:fld id="{ACC001CD-8C42-4D76-B3BE-7A9DD50F3019}" type="datetimeFigureOut">
               <a:rPr lang="en-US" smtClean="0"/>
-              <a:t>2/27/2020</a:t>
+              <a:t>2/28/2020</a:t>
             </a:fld>
             <a:endParaRPr lang="en-US"/>
           </a:p>
@@ -2917,7 +2923,7 @@
           <a:p>
             <a:fld id="{ACC001CD-8C42-4D76-B3BE-7A9DD50F3019}" type="datetimeFigureOut">
               <a:rPr lang="en-US" smtClean="0"/>
-              <a:t>2/27/2020</a:t>
+              <a:t>2/28/2020</a:t>
             </a:fld>
             <a:endParaRPr lang="en-US"/>
           </a:p>
@@ -4093,6 +4099,116 @@
     <p:extLst>
       <p:ext uri="{BB962C8B-B14F-4D97-AF65-F5344CB8AC3E}">
         <p14:creationId xmlns:p14="http://schemas.microsoft.com/office/powerpoint/2010/main" val="4243124323"/>
+      </p:ext>
+    </p:extLst>
+  </p:cSld>
+  <p:clrMapOvr>
+    <a:masterClrMapping/>
+  </p:clrMapOvr>
+</p:sld>
+</file>
+
+<file path=ppt/slides/slide15.xml><?xml version="1.0" encoding="utf-8"?>
+<p:sld xmlns:a="http://schemas.openxmlformats.org/drawingml/2006/main" xmlns:r="http://schemas.openxmlformats.org/officeDocument/2006/relationships" xmlns:p="http://schemas.openxmlformats.org/presentationml/2006/main">
+  <p:cSld>
+    <p:spTree>
+      <p:nvGrpSpPr>
+        <p:cNvPr id="1" name=""/>
+        <p:cNvGrpSpPr/>
+        <p:nvPr/>
+      </p:nvGrpSpPr>
+      <p:grpSpPr>
+        <a:xfrm>
+          <a:off x="0" y="0"/>
+          <a:ext cx="0" cy="0"/>
+          <a:chOff x="0" y="0"/>
+          <a:chExt cx="0" cy="0"/>
+        </a:xfrm>
+      </p:grpSpPr>
+      <p:sp>
+        <p:nvSpPr>
+          <p:cNvPr id="2" name="Title 1">
+            <a:extLst>
+              <a:ext uri="{FF2B5EF4-FFF2-40B4-BE49-F238E27FC236}">
+                <a16:creationId xmlns:a16="http://schemas.microsoft.com/office/drawing/2014/main" id="{EF73907A-1CA0-4A6E-8AB1-FF3FB61EF20F}"/>
+              </a:ext>
+            </a:extLst>
+          </p:cNvPr>
+          <p:cNvSpPr>
+            <a:spLocks noGrp="1"/>
+          </p:cNvSpPr>
+          <p:nvPr>
+            <p:ph type="title"/>
+          </p:nvPr>
+        </p:nvSpPr>
+        <p:spPr/>
+        <p:txBody>
+          <a:bodyPr/>
+          <a:lstStyle/>
+          <a:p>
+            <a:endParaRPr lang="en-US"/>
+          </a:p>
+        </p:txBody>
+      </p:sp>
+      <p:sp>
+        <p:nvSpPr>
+          <p:cNvPr id="3" name="Content Placeholder 2">
+            <a:extLst>
+              <a:ext uri="{FF2B5EF4-FFF2-40B4-BE49-F238E27FC236}">
+                <a16:creationId xmlns:a16="http://schemas.microsoft.com/office/drawing/2014/main" id="{5CBFC411-D1E3-44DF-8EAE-3BBAEF218EC6}"/>
+              </a:ext>
+            </a:extLst>
+          </p:cNvPr>
+          <p:cNvSpPr>
+            <a:spLocks noGrp="1"/>
+          </p:cNvSpPr>
+          <p:nvPr>
+            <p:ph idx="1"/>
+          </p:nvPr>
+        </p:nvSpPr>
+        <p:spPr/>
+        <p:txBody>
+          <a:bodyPr/>
+          <a:lstStyle/>
+          <a:p>
+            <a:endParaRPr lang="en-US"/>
+          </a:p>
+        </p:txBody>
+      </p:sp>
+      <p:pic>
+        <p:nvPicPr>
+          <p:cNvPr id="4" name="Picture 3">
+            <a:extLst>
+              <a:ext uri="{FF2B5EF4-FFF2-40B4-BE49-F238E27FC236}">
+                <a16:creationId xmlns:a16="http://schemas.microsoft.com/office/drawing/2014/main" id="{690C57B8-5F29-4ED3-BF89-4F32AFB9FFF8}"/>
+              </a:ext>
+            </a:extLst>
+          </p:cNvPr>
+          <p:cNvPicPr>
+            <a:picLocks noChangeAspect="1"/>
+          </p:cNvPicPr>
+          <p:nvPr/>
+        </p:nvPicPr>
+        <p:blipFill>
+          <a:blip r:embed="rId2"/>
+          <a:stretch>
+            <a:fillRect/>
+          </a:stretch>
+        </p:blipFill>
+        <p:spPr>
+          <a:xfrm>
+            <a:off x="428016" y="2437116"/>
+            <a:ext cx="12305489" cy="15788913"/>
+          </a:xfrm>
+          <a:prstGeom prst="rect">
+            <a:avLst/>
+          </a:prstGeom>
+        </p:spPr>
+      </p:pic>
+    </p:spTree>
+    <p:extLst>
+      <p:ext uri="{BB962C8B-B14F-4D97-AF65-F5344CB8AC3E}">
+        <p14:creationId xmlns:p14="http://schemas.microsoft.com/office/powerpoint/2010/main" val="3786379017"/>
       </p:ext>
     </p:extLst>
   </p:cSld>

</xml_diff>

<commit_message>
finished tutorial and added qr for sim worlds
</commit_message>
<xml_diff>
--- a/Tutorials/MainTutorial.pptx
+++ b/Tutorials/MainTutorial.pptx
@@ -23,8 +23,9 @@
     <p:sldId id="267" r:id="rId17"/>
     <p:sldId id="268" r:id="rId18"/>
     <p:sldId id="273" r:id="rId19"/>
-    <p:sldId id="276" r:id="rId20"/>
-    <p:sldId id="277" r:id="rId21"/>
+    <p:sldId id="278" r:id="rId20"/>
+    <p:sldId id="276" r:id="rId21"/>
+    <p:sldId id="277" r:id="rId22"/>
   </p:sldIdLst>
   <p:sldSz cx="12192000" cy="6858000"/>
   <p:notesSz cx="6858000" cy="9144000"/>
@@ -5324,6 +5325,316 @@
           <p:cNvPr id="2" name="Title 1">
             <a:extLst>
               <a:ext uri="{FF2B5EF4-FFF2-40B4-BE49-F238E27FC236}">
+                <a16:creationId xmlns:a16="http://schemas.microsoft.com/office/drawing/2014/main" id="{EBF141B7-167D-4BCF-AA24-4CABD74CA50C}"/>
+              </a:ext>
+            </a:extLst>
+          </p:cNvPr>
+          <p:cNvSpPr>
+            <a:spLocks noGrp="1"/>
+          </p:cNvSpPr>
+          <p:nvPr>
+            <p:ph type="title"/>
+          </p:nvPr>
+        </p:nvSpPr>
+        <p:spPr/>
+        <p:txBody>
+          <a:bodyPr/>
+          <a:lstStyle/>
+          <a:p>
+            <a:r>
+              <a:rPr lang="en-US" dirty="0"/>
+              <a:t>More Worlds</a:t>
+            </a:r>
+          </a:p>
+        </p:txBody>
+      </p:sp>
+      <p:sp>
+        <p:nvSpPr>
+          <p:cNvPr id="3" name="Content Placeholder 2">
+            <a:extLst>
+              <a:ext uri="{FF2B5EF4-FFF2-40B4-BE49-F238E27FC236}">
+                <a16:creationId xmlns:a16="http://schemas.microsoft.com/office/drawing/2014/main" id="{ABCAFE0A-1B88-46CE-B0A4-C8785B72B850}"/>
+              </a:ext>
+            </a:extLst>
+          </p:cNvPr>
+          <p:cNvSpPr>
+            <a:spLocks noGrp="1"/>
+          </p:cNvSpPr>
+          <p:nvPr>
+            <p:ph idx="1"/>
+          </p:nvPr>
+        </p:nvSpPr>
+        <p:spPr>
+          <a:xfrm>
+            <a:off x="5257799" y="2141537"/>
+            <a:ext cx="5393871" cy="4351338"/>
+          </a:xfrm>
+        </p:spPr>
+        <p:txBody>
+          <a:bodyPr/>
+          <a:lstStyle/>
+          <a:p>
+            <a:r>
+              <a:rPr lang="en-US" dirty="0"/>
+              <a:t>To see more world types as well as much more detailed info about the </a:t>
+            </a:r>
+            <a:r>
+              <a:rPr lang="en-US" dirty="0" err="1"/>
+              <a:t>turtlebot</a:t>
+            </a:r>
+            <a:r>
+              <a:rPr lang="en-US" dirty="0"/>
+              <a:t> and ROS go here:</a:t>
+            </a:r>
+          </a:p>
+          <a:p>
+            <a:r>
+              <a:rPr lang="en-US" dirty="0">
+                <a:hlinkClick r:id="rId2"/>
+              </a:rPr>
+              <a:t>http://emanual.robotis.com/docs/en/platform/turtlebot3/simulation/#turtlebot3-simulation-using-fake-node</a:t>
+            </a:r>
+            <a:endParaRPr lang="en-US" dirty="0"/>
+          </a:p>
+        </p:txBody>
+      </p:sp>
+      <p:pic>
+        <p:nvPicPr>
+          <p:cNvPr id="5" name="Picture 4" descr="A picture containing crossword, indoor, text, black&#10;&#10;Description automatically generated">
+            <a:extLst>
+              <a:ext uri="{FF2B5EF4-FFF2-40B4-BE49-F238E27FC236}">
+                <a16:creationId xmlns:a16="http://schemas.microsoft.com/office/drawing/2014/main" id="{9C3CFDE8-A06D-4880-A3AF-508B4A6FFCE8}"/>
+              </a:ext>
+            </a:extLst>
+          </p:cNvPr>
+          <p:cNvPicPr>
+            <a:picLocks noChangeAspect="1"/>
+          </p:cNvPicPr>
+          <p:nvPr/>
+        </p:nvPicPr>
+        <p:blipFill>
+          <a:blip r:embed="rId3">
+            <a:extLst>
+              <a:ext uri="{28A0092B-C50C-407E-A947-70E740481C1C}">
+                <a14:useLocalDpi xmlns:a14="http://schemas.microsoft.com/office/drawing/2010/main" val="0"/>
+              </a:ext>
+            </a:extLst>
+          </a:blip>
+          <a:stretch>
+            <a:fillRect/>
+          </a:stretch>
+        </p:blipFill>
+        <p:spPr>
+          <a:xfrm>
+            <a:off x="1932214" y="2514600"/>
+            <a:ext cx="1828800" cy="1828800"/>
+          </a:xfrm>
+          <a:prstGeom prst="rect">
+            <a:avLst/>
+          </a:prstGeom>
+        </p:spPr>
+      </p:pic>
+    </p:spTree>
+    <p:extLst>
+      <p:ext uri="{BB962C8B-B14F-4D97-AF65-F5344CB8AC3E}">
+        <p14:creationId xmlns:p14="http://schemas.microsoft.com/office/powerpoint/2010/main" val="3578502794"/>
+      </p:ext>
+    </p:extLst>
+  </p:cSld>
+  <p:clrMapOvr>
+    <a:masterClrMapping/>
+  </p:clrMapOvr>
+</p:sld>
+</file>
+
+<file path=ppt/slides/slide2.xml><?xml version="1.0" encoding="utf-8"?>
+<p:sld xmlns:a="http://schemas.openxmlformats.org/drawingml/2006/main" xmlns:r="http://schemas.openxmlformats.org/officeDocument/2006/relationships" xmlns:p="http://schemas.openxmlformats.org/presentationml/2006/main">
+  <p:cSld>
+    <p:spTree>
+      <p:nvGrpSpPr>
+        <p:cNvPr id="1" name=""/>
+        <p:cNvGrpSpPr/>
+        <p:nvPr/>
+      </p:nvGrpSpPr>
+      <p:grpSpPr>
+        <a:xfrm>
+          <a:off x="0" y="0"/>
+          <a:ext cx="0" cy="0"/>
+          <a:chOff x="0" y="0"/>
+          <a:chExt cx="0" cy="0"/>
+        </a:xfrm>
+      </p:grpSpPr>
+      <p:sp>
+        <p:nvSpPr>
+          <p:cNvPr id="2" name="Title 1">
+            <a:extLst>
+              <a:ext uri="{FF2B5EF4-FFF2-40B4-BE49-F238E27FC236}">
+                <a16:creationId xmlns:a16="http://schemas.microsoft.com/office/drawing/2014/main" id="{F51F58E7-146B-44E9-8C08-DB020E0A6186}"/>
+              </a:ext>
+            </a:extLst>
+          </p:cNvPr>
+          <p:cNvSpPr>
+            <a:spLocks noGrp="1"/>
+          </p:cNvSpPr>
+          <p:nvPr>
+            <p:ph type="title"/>
+          </p:nvPr>
+        </p:nvSpPr>
+        <p:spPr/>
+        <p:txBody>
+          <a:bodyPr/>
+          <a:lstStyle/>
+          <a:p>
+            <a:r>
+              <a:rPr lang="en-US" dirty="0"/>
+              <a:t>Step 1: The Virtual Machine</a:t>
+            </a:r>
+          </a:p>
+        </p:txBody>
+      </p:sp>
+      <p:sp>
+        <p:nvSpPr>
+          <p:cNvPr id="3" name="Content Placeholder 2">
+            <a:extLst>
+              <a:ext uri="{FF2B5EF4-FFF2-40B4-BE49-F238E27FC236}">
+                <a16:creationId xmlns:a16="http://schemas.microsoft.com/office/drawing/2014/main" id="{F22BE8C5-1D53-4EDB-AA16-52689F6A4FD6}"/>
+              </a:ext>
+            </a:extLst>
+          </p:cNvPr>
+          <p:cNvSpPr>
+            <a:spLocks noGrp="1"/>
+          </p:cNvSpPr>
+          <p:nvPr>
+            <p:ph idx="1"/>
+          </p:nvPr>
+        </p:nvSpPr>
+        <p:spPr/>
+        <p:txBody>
+          <a:bodyPr/>
+          <a:lstStyle/>
+          <a:p>
+            <a:r>
+              <a:rPr lang="en-US" dirty="0"/>
+              <a:t>ROS and SLAM run on a Linux operating system called Ubuntu.</a:t>
+            </a:r>
+          </a:p>
+          <a:p>
+            <a:r>
+              <a:rPr lang="en-US" dirty="0"/>
+              <a:t>  Unless we want to completely wipe out the existing OS on our computer it would be a good idea to use a virtual machine instead.</a:t>
+            </a:r>
+          </a:p>
+          <a:p>
+            <a:r>
+              <a:rPr lang="en-US" dirty="0"/>
+              <a:t>  A virtual machine is like a small computer within a computer, so that the small computer won't affect the outer computer.</a:t>
+            </a:r>
+          </a:p>
+          <a:p>
+            <a:r>
+              <a:rPr lang="en-US" dirty="0"/>
+              <a:t>  We will be using Oracle VM VirtualBox.</a:t>
+            </a:r>
+          </a:p>
+          <a:p>
+            <a:r>
+              <a:rPr lang="en-US" dirty="0"/>
+              <a:t>  VirtualBox can be found at: </a:t>
+            </a:r>
+            <a:r>
+              <a:rPr lang="en-US" dirty="0">
+                <a:hlinkClick r:id="rId2"/>
+              </a:rPr>
+              <a:t>https://www.virtualbox.org/</a:t>
+            </a:r>
+            <a:endParaRPr lang="en-US" dirty="0"/>
+          </a:p>
+          <a:p>
+            <a:r>
+              <a:rPr lang="en-US" dirty="0"/>
+              <a:t>To install VirtualBox: </a:t>
+            </a:r>
+            <a:r>
+              <a:rPr lang="en-US" dirty="0">
+                <a:hlinkClick r:id="rId3" action="ppaction://hlinkpres?slideindex=1&amp;slidetitle="/>
+              </a:rPr>
+              <a:t>VirtualBox Install</a:t>
+            </a:r>
+            <a:endParaRPr lang="en-US" dirty="0"/>
+          </a:p>
+        </p:txBody>
+      </p:sp>
+      <p:pic>
+        <p:nvPicPr>
+          <p:cNvPr id="5" name="Picture 4" descr="A picture containing black, drawing&#10;&#10;Description automatically generated">
+            <a:extLst>
+              <a:ext uri="{FF2B5EF4-FFF2-40B4-BE49-F238E27FC236}">
+                <a16:creationId xmlns:a16="http://schemas.microsoft.com/office/drawing/2014/main" id="{8DA3A4D6-3E02-4A7D-AD01-838298ED2A53}"/>
+              </a:ext>
+            </a:extLst>
+          </p:cNvPr>
+          <p:cNvPicPr>
+            <a:picLocks noChangeAspect="1"/>
+          </p:cNvPicPr>
+          <p:nvPr/>
+        </p:nvPicPr>
+        <p:blipFill>
+          <a:blip r:embed="rId4">
+            <a:extLst>
+              <a:ext uri="{28A0092B-C50C-407E-A947-70E740481C1C}">
+                <a14:useLocalDpi xmlns:a14="http://schemas.microsoft.com/office/drawing/2010/main" val="0"/>
+              </a:ext>
+            </a:extLst>
+          </a:blip>
+          <a:stretch>
+            <a:fillRect/>
+          </a:stretch>
+        </p:blipFill>
+        <p:spPr>
+          <a:xfrm>
+            <a:off x="10041833" y="4624318"/>
+            <a:ext cx="1828800" cy="1828800"/>
+          </a:xfrm>
+          <a:prstGeom prst="rect">
+            <a:avLst/>
+          </a:prstGeom>
+        </p:spPr>
+      </p:pic>
+    </p:spTree>
+    <p:extLst>
+      <p:ext uri="{BB962C8B-B14F-4D97-AF65-F5344CB8AC3E}">
+        <p14:creationId xmlns:p14="http://schemas.microsoft.com/office/powerpoint/2010/main" val="2294074676"/>
+      </p:ext>
+    </p:extLst>
+  </p:cSld>
+  <p:clrMapOvr>
+    <a:masterClrMapping/>
+  </p:clrMapOvr>
+</p:sld>
+</file>
+
+<file path=ppt/slides/slide20.xml><?xml version="1.0" encoding="utf-8"?>
+<p:sld xmlns:a="http://schemas.openxmlformats.org/drawingml/2006/main" xmlns:r="http://schemas.openxmlformats.org/officeDocument/2006/relationships" xmlns:p="http://schemas.openxmlformats.org/presentationml/2006/main">
+  <p:cSld>
+    <p:spTree>
+      <p:nvGrpSpPr>
+        <p:cNvPr id="1" name=""/>
+        <p:cNvGrpSpPr/>
+        <p:nvPr/>
+      </p:nvGrpSpPr>
+      <p:grpSpPr>
+        <a:xfrm>
+          <a:off x="0" y="0"/>
+          <a:ext cx="0" cy="0"/>
+          <a:chOff x="0" y="0"/>
+          <a:chExt cx="0" cy="0"/>
+        </a:xfrm>
+      </p:grpSpPr>
+      <p:sp>
+        <p:nvSpPr>
+          <p:cNvPr id="2" name="Title 1">
+            <a:extLst>
+              <a:ext uri="{FF2B5EF4-FFF2-40B4-BE49-F238E27FC236}">
                 <a16:creationId xmlns:a16="http://schemas.microsoft.com/office/drawing/2014/main" id="{B4CD5E75-E785-4341-A7BF-F4B32DA70A8F}"/>
               </a:ext>
             </a:extLst>
@@ -5451,173 +5762,7 @@
 </p:sld>
 </file>
 
-<file path=ppt/slides/slide2.xml><?xml version="1.0" encoding="utf-8"?>
-<p:sld xmlns:a="http://schemas.openxmlformats.org/drawingml/2006/main" xmlns:r="http://schemas.openxmlformats.org/officeDocument/2006/relationships" xmlns:p="http://schemas.openxmlformats.org/presentationml/2006/main">
-  <p:cSld>
-    <p:spTree>
-      <p:nvGrpSpPr>
-        <p:cNvPr id="1" name=""/>
-        <p:cNvGrpSpPr/>
-        <p:nvPr/>
-      </p:nvGrpSpPr>
-      <p:grpSpPr>
-        <a:xfrm>
-          <a:off x="0" y="0"/>
-          <a:ext cx="0" cy="0"/>
-          <a:chOff x="0" y="0"/>
-          <a:chExt cx="0" cy="0"/>
-        </a:xfrm>
-      </p:grpSpPr>
-      <p:sp>
-        <p:nvSpPr>
-          <p:cNvPr id="2" name="Title 1">
-            <a:extLst>
-              <a:ext uri="{FF2B5EF4-FFF2-40B4-BE49-F238E27FC236}">
-                <a16:creationId xmlns:a16="http://schemas.microsoft.com/office/drawing/2014/main" id="{F51F58E7-146B-44E9-8C08-DB020E0A6186}"/>
-              </a:ext>
-            </a:extLst>
-          </p:cNvPr>
-          <p:cNvSpPr>
-            <a:spLocks noGrp="1"/>
-          </p:cNvSpPr>
-          <p:nvPr>
-            <p:ph type="title"/>
-          </p:nvPr>
-        </p:nvSpPr>
-        <p:spPr/>
-        <p:txBody>
-          <a:bodyPr/>
-          <a:lstStyle/>
-          <a:p>
-            <a:r>
-              <a:rPr lang="en-US" dirty="0"/>
-              <a:t>Step 1: The Virtual Machine</a:t>
-            </a:r>
-          </a:p>
-        </p:txBody>
-      </p:sp>
-      <p:sp>
-        <p:nvSpPr>
-          <p:cNvPr id="3" name="Content Placeholder 2">
-            <a:extLst>
-              <a:ext uri="{FF2B5EF4-FFF2-40B4-BE49-F238E27FC236}">
-                <a16:creationId xmlns:a16="http://schemas.microsoft.com/office/drawing/2014/main" id="{F22BE8C5-1D53-4EDB-AA16-52689F6A4FD6}"/>
-              </a:ext>
-            </a:extLst>
-          </p:cNvPr>
-          <p:cNvSpPr>
-            <a:spLocks noGrp="1"/>
-          </p:cNvSpPr>
-          <p:nvPr>
-            <p:ph idx="1"/>
-          </p:nvPr>
-        </p:nvSpPr>
-        <p:spPr/>
-        <p:txBody>
-          <a:bodyPr/>
-          <a:lstStyle/>
-          <a:p>
-            <a:r>
-              <a:rPr lang="en-US" dirty="0"/>
-              <a:t>ROS and SLAM run on a Linux operating system called Ubuntu.</a:t>
-            </a:r>
-          </a:p>
-          <a:p>
-            <a:r>
-              <a:rPr lang="en-US" dirty="0"/>
-              <a:t>  Unless we want to completely wipe out the existing OS on our computer it would be a good idea to use a virtual machine instead.</a:t>
-            </a:r>
-          </a:p>
-          <a:p>
-            <a:r>
-              <a:rPr lang="en-US" dirty="0"/>
-              <a:t>  A virtual machine is like a small computer within a computer, so that the small computer won't affect the outer computer.</a:t>
-            </a:r>
-          </a:p>
-          <a:p>
-            <a:r>
-              <a:rPr lang="en-US" dirty="0"/>
-              <a:t>  We will be using Oracle VM VirtualBox.</a:t>
-            </a:r>
-          </a:p>
-          <a:p>
-            <a:r>
-              <a:rPr lang="en-US" dirty="0"/>
-              <a:t>  VirtualBox can be found at: </a:t>
-            </a:r>
-            <a:r>
-              <a:rPr lang="en-US" dirty="0">
-                <a:hlinkClick r:id="rId2"/>
-              </a:rPr>
-              <a:t>https://www.virtualbox.org/</a:t>
-            </a:r>
-            <a:endParaRPr lang="en-US" dirty="0"/>
-          </a:p>
-          <a:p>
-            <a:r>
-              <a:rPr lang="en-US" dirty="0"/>
-              <a:t>To install VirtualBox: </a:t>
-            </a:r>
-            <a:r>
-              <a:rPr lang="en-US" dirty="0">
-                <a:hlinkClick r:id="rId3" action="ppaction://hlinkpres?slideindex=1&amp;slidetitle="/>
-              </a:rPr>
-              <a:t>VirtualBox Install</a:t>
-            </a:r>
-            <a:endParaRPr lang="en-US" dirty="0"/>
-          </a:p>
-        </p:txBody>
-      </p:sp>
-      <p:pic>
-        <p:nvPicPr>
-          <p:cNvPr id="5" name="Picture 4" descr="A picture containing black, drawing&#10;&#10;Description automatically generated">
-            <a:extLst>
-              <a:ext uri="{FF2B5EF4-FFF2-40B4-BE49-F238E27FC236}">
-                <a16:creationId xmlns:a16="http://schemas.microsoft.com/office/drawing/2014/main" id="{8DA3A4D6-3E02-4A7D-AD01-838298ED2A53}"/>
-              </a:ext>
-            </a:extLst>
-          </p:cNvPr>
-          <p:cNvPicPr>
-            <a:picLocks noChangeAspect="1"/>
-          </p:cNvPicPr>
-          <p:nvPr/>
-        </p:nvPicPr>
-        <p:blipFill>
-          <a:blip r:embed="rId4">
-            <a:extLst>
-              <a:ext uri="{28A0092B-C50C-407E-A947-70E740481C1C}">
-                <a14:useLocalDpi xmlns:a14="http://schemas.microsoft.com/office/drawing/2010/main" val="0"/>
-              </a:ext>
-            </a:extLst>
-          </a:blip>
-          <a:stretch>
-            <a:fillRect/>
-          </a:stretch>
-        </p:blipFill>
-        <p:spPr>
-          <a:xfrm>
-            <a:off x="10041833" y="4624318"/>
-            <a:ext cx="1828800" cy="1828800"/>
-          </a:xfrm>
-          <a:prstGeom prst="rect">
-            <a:avLst/>
-          </a:prstGeom>
-        </p:spPr>
-      </p:pic>
-    </p:spTree>
-    <p:extLst>
-      <p:ext uri="{BB962C8B-B14F-4D97-AF65-F5344CB8AC3E}">
-        <p14:creationId xmlns:p14="http://schemas.microsoft.com/office/powerpoint/2010/main" val="2294074676"/>
-      </p:ext>
-    </p:extLst>
-  </p:cSld>
-  <p:clrMapOvr>
-    <a:masterClrMapping/>
-  </p:clrMapOvr>
-</p:sld>
-</file>
-
-<file path=ppt/slides/slide20.xml><?xml version="1.0" encoding="utf-8"?>
+<file path=ppt/slides/slide21.xml><?xml version="1.0" encoding="utf-8"?>
 <p:sld xmlns:a="http://schemas.openxmlformats.org/drawingml/2006/main" xmlns:r="http://schemas.openxmlformats.org/officeDocument/2006/relationships" xmlns:p="http://schemas.openxmlformats.org/presentationml/2006/main">
   <p:cSld>
     <p:spTree>

</xml_diff>

<commit_message>
fixed slide to keep window open for control
</commit_message>
<xml_diff>
--- a/Tutorials/MainTutorial.pptx
+++ b/Tutorials/MainTutorial.pptx
@@ -5184,7 +5184,9 @@
           </a:xfrm>
         </p:spPr>
         <p:txBody>
-          <a:bodyPr/>
+          <a:bodyPr>
+            <a:normAutofit fontScale="92500" lnSpcReduction="10000"/>
+          </a:bodyPr>
           <a:lstStyle/>
           <a:p>
             <a:r>
@@ -5251,6 +5253,17 @@
               <a:rPr lang="en-US" dirty="0"/>
               <a:t> turtlebot3_teleop turtlebot3_teleop_key.launch</a:t>
             </a:r>
+          </a:p>
+          <a:p>
+            <a:r>
+              <a:rPr lang="en-US" dirty="0"/>
+              <a:t>This window needs to be open to control the </a:t>
+            </a:r>
+            <a:r>
+              <a:rPr lang="en-US" dirty="0" err="1"/>
+              <a:t>robo</a:t>
+            </a:r>
+            <a:endParaRPr lang="en-US" dirty="0"/>
           </a:p>
           <a:p>
             <a:endParaRPr lang="en-US" dirty="0"/>
@@ -5850,10 +5863,10 @@
       </p:sp>
       <p:pic>
         <p:nvPicPr>
-          <p:cNvPr id="4" name="Picture 3">
-            <a:extLst>
-              <a:ext uri="{FF2B5EF4-FFF2-40B4-BE49-F238E27FC236}">
-                <a16:creationId xmlns:a16="http://schemas.microsoft.com/office/drawing/2014/main" id="{23F70D3C-8B76-4790-B81A-30A95DD232C5}"/>
+          <p:cNvPr id="5" name="Picture 4">
+            <a:extLst>
+              <a:ext uri="{FF2B5EF4-FFF2-40B4-BE49-F238E27FC236}">
+                <a16:creationId xmlns:a16="http://schemas.microsoft.com/office/drawing/2014/main" id="{28B95DEA-0EF8-4D4B-BD03-E9FF20E7DEF1}"/>
               </a:ext>
             </a:extLst>
           </p:cNvPr>
@@ -5870,8 +5883,8 @@
         </p:blipFill>
         <p:spPr>
           <a:xfrm>
-            <a:off x="302680" y="1825625"/>
-            <a:ext cx="6151357" cy="3856718"/>
+            <a:off x="302682" y="1825625"/>
+            <a:ext cx="5439533" cy="3419952"/>
           </a:xfrm>
           <a:prstGeom prst="rect">
             <a:avLst/>

</xml_diff>